<commit_message>
latest changes to docs and links
</commit_message>
<xml_diff>
--- a/EndSem/2018AH04042_EndSem_Review.pptx
+++ b/EndSem/2018AH04042_EndSem_Review.pptx
@@ -5,10 +5,10 @@
     <p:sldMasterId id="2147483678" r:id="rId1"/>
   </p:sldMasterIdLst>
   <p:notesMasterIdLst>
-    <p:notesMasterId r:id="rId20"/>
+    <p:notesMasterId r:id="rId22"/>
   </p:notesMasterIdLst>
   <p:handoutMasterIdLst>
-    <p:handoutMasterId r:id="rId21"/>
+    <p:handoutMasterId r:id="rId23"/>
   </p:handoutMasterIdLst>
   <p:sldIdLst>
     <p:sldId id="256" r:id="rId2"/>
@@ -29,6 +29,8 @@
     <p:sldId id="274" r:id="rId17"/>
     <p:sldId id="275" r:id="rId18"/>
     <p:sldId id="276" r:id="rId19"/>
+    <p:sldId id="277" r:id="rId20"/>
+    <p:sldId id="278" r:id="rId21"/>
   </p:sldIdLst>
   <p:sldSz cx="12192000" cy="6858000"/>
   <p:notesSz cx="6858000" cy="9144000"/>
@@ -217,7 +219,7 @@
           <a:p>
             <a:fld id="{5986ECD6-3CAA-47D7-84AD-70E9036A2DB0}" type="datetimeFigureOut">
               <a:rPr lang="en-US" smtClean="0"/>
-              <a:t>1/10/2021</a:t>
+              <a:t>1/17/2021</a:t>
             </a:fld>
             <a:endParaRPr lang="en-US"/>
           </a:p>
@@ -387,7 +389,7 @@
           <a:p>
             <a:fld id="{1E2080E5-AFA1-4BEC-ADA5-03C5F748D1AC}" type="datetimeFigureOut">
               <a:rPr lang="en-US" smtClean="0"/>
-              <a:t>1/10/2021</a:t>
+              <a:t>1/17/2021</a:t>
             </a:fld>
             <a:endParaRPr lang="en-US"/>
           </a:p>
@@ -1100,7 +1102,7 @@
           <a:p>
             <a:fld id="{8415DB50-DBA0-41E0-B077-E6665E88B3A9}" type="datetime1">
               <a:rPr lang="en-US" smtClean="0"/>
-              <a:t>1/10/2021</a:t>
+              <a:t>1/17/2021</a:t>
             </a:fld>
             <a:endParaRPr lang="en-US"/>
           </a:p>
@@ -1312,7 +1314,7 @@
           <a:p>
             <a:fld id="{ADFC5DE0-1B1F-4B6A-B556-A174B97E878F}" type="datetime1">
               <a:rPr lang="en-US" smtClean="0"/>
-              <a:t>1/10/2021</a:t>
+              <a:t>1/17/2021</a:t>
             </a:fld>
             <a:endParaRPr lang="en-US"/>
           </a:p>
@@ -1572,7 +1574,7 @@
           <a:p>
             <a:fld id="{E38E989A-2E20-43AB-9258-32DB8F49B3B9}" type="datetime1">
               <a:rPr lang="en-US" smtClean="0"/>
-              <a:t>1/10/2021</a:t>
+              <a:t>1/17/2021</a:t>
             </a:fld>
             <a:endParaRPr lang="en-US"/>
           </a:p>
@@ -1750,7 +1752,7 @@
           <a:p>
             <a:fld id="{29E3418B-068E-44B7-8AAE-E8FD369A7A7B}" type="datetime1">
               <a:rPr lang="en-US" smtClean="0"/>
-              <a:t>1/10/2021</a:t>
+              <a:t>1/17/2021</a:t>
             </a:fld>
             <a:endParaRPr lang="en-US"/>
           </a:p>
@@ -2097,7 +2099,7 @@
           <a:p>
             <a:fld id="{54F72A23-4870-4D6E-AEF2-E20C71E8564D}" type="datetime1">
               <a:rPr lang="en-US" smtClean="0"/>
-              <a:t>1/10/2021</a:t>
+              <a:t>1/17/2021</a:t>
             </a:fld>
             <a:endParaRPr lang="en-US"/>
           </a:p>
@@ -2376,7 +2378,7 @@
           <a:p>
             <a:fld id="{A237AEB8-3497-4246-878E-068F73389B79}" type="datetime1">
               <a:rPr lang="en-US" smtClean="0"/>
-              <a:t>1/10/2021</a:t>
+              <a:t>1/17/2021</a:t>
             </a:fld>
             <a:endParaRPr lang="en-US"/>
           </a:p>
@@ -2759,7 +2761,7 @@
           <a:p>
             <a:fld id="{9702AE7D-E51C-4A63-BE0D-BFEFE733C797}" type="datetime1">
               <a:rPr lang="en-US" smtClean="0"/>
-              <a:t>1/10/2021</a:t>
+              <a:t>1/17/2021</a:t>
             </a:fld>
             <a:endParaRPr lang="en-US"/>
           </a:p>
@@ -2881,7 +2883,7 @@
           <a:p>
             <a:fld id="{CF5C3C2C-7C2F-45F9-8CC4-77608003A98B}" type="datetime1">
               <a:rPr lang="en-US" smtClean="0"/>
-              <a:t>1/10/2021</a:t>
+              <a:t>1/17/2021</a:t>
             </a:fld>
             <a:endParaRPr lang="en-US"/>
           </a:p>
@@ -3056,7 +3058,7 @@
           <a:p>
             <a:fld id="{49D9EA78-C0D8-4D47-8C89-3DD18C7F548E}" type="datetime1">
               <a:rPr lang="en-US" smtClean="0"/>
-              <a:t>1/10/2021</a:t>
+              <a:t>1/17/2021</a:t>
             </a:fld>
             <a:endParaRPr lang="en-US"/>
           </a:p>
@@ -3414,7 +3416,7 @@
           <a:p>
             <a:fld id="{D33E0231-2E71-4995-B882-1B8B76FDCE6C}" type="datetime1">
               <a:rPr lang="en-US" smtClean="0"/>
-              <a:t>1/10/2021</a:t>
+              <a:t>1/17/2021</a:t>
             </a:fld>
             <a:endParaRPr lang="en-US"/>
           </a:p>
@@ -3800,7 +3802,7 @@
           <a:p>
             <a:fld id="{EA4C2C7D-2DAD-4CAD-8B46-43FF4CCBC883}" type="datetime1">
               <a:rPr lang="en-US" smtClean="0"/>
-              <a:t>1/10/2021</a:t>
+              <a:t>1/17/2021</a:t>
             </a:fld>
             <a:endParaRPr lang="en-US"/>
           </a:p>
@@ -4091,7 +4093,7 @@
           <a:p>
             <a:fld id="{AF76F285-819F-464E-9DA0-59EDDC10CF20}" type="datetime1">
               <a:rPr lang="en-US" smtClean="0"/>
-              <a:t>1/10/2021</a:t>
+              <a:t>1/17/2021</a:t>
             </a:fld>
             <a:endParaRPr lang="en-US"/>
           </a:p>
@@ -5338,7 +5340,6 @@
               <a:rPr lang="en-US" dirty="0"/>
               <a:t>texture and calculate a local binary pattern (LBP)</a:t>
             </a:r>
-            <a:endParaRPr lang="en-US" dirty="0"/>
           </a:p>
         </p:txBody>
       </p:sp>
@@ -5591,11 +5592,7 @@
           <a:p>
             <a:r>
               <a:rPr lang="en-US" sz="4400" b="1" dirty="0" smtClean="0"/>
-              <a:t>Code</a:t>
-            </a:r>
-            <a:r>
-              <a:rPr lang="en-US" sz="4400" b="1" dirty="0" smtClean="0"/>
-              <a:t>: Implement LBP and Plot Histograms</a:t>
+              <a:t>Code: Implement LBP and Plot Histograms</a:t>
             </a:r>
             <a:endParaRPr lang="en-US" sz="4400" b="1" dirty="0"/>
           </a:p>
@@ -5745,11 +5742,7 @@
           <a:p>
             <a:r>
               <a:rPr lang="en-US" sz="4000" b="1" dirty="0"/>
-              <a:t>Result: </a:t>
-            </a:r>
-            <a:r>
-              <a:rPr lang="en-US" sz="4000" b="1" dirty="0"/>
-              <a:t>Before using a facial </a:t>
+              <a:t>Result: Before using a facial </a:t>
             </a:r>
             <a:r>
               <a:rPr lang="en-US" sz="4000" b="1" dirty="0" smtClean="0"/>
@@ -6079,11 +6072,7 @@
           <a:p>
             <a:r>
               <a:rPr lang="en-US" sz="4000" b="1" dirty="0"/>
-              <a:t>Result: </a:t>
-            </a:r>
-            <a:r>
-              <a:rPr lang="en-US" sz="4000" b="1" dirty="0"/>
-              <a:t>Before using a facial </a:t>
+              <a:t>Result: Before using a facial </a:t>
             </a:r>
             <a:r>
               <a:rPr lang="en-US" sz="4000" b="1" dirty="0" smtClean="0"/>
@@ -6244,11 +6233,7 @@
           <a:p>
             <a:r>
               <a:rPr lang="en-US" sz="4000" b="1" dirty="0"/>
-              <a:t>Result: </a:t>
-            </a:r>
-            <a:r>
-              <a:rPr lang="en-US" sz="4000" b="1" dirty="0"/>
-              <a:t>Before using a facial </a:t>
+              <a:t>Result: Before using a facial </a:t>
             </a:r>
             <a:r>
               <a:rPr lang="en-US" sz="4000" b="1" dirty="0" smtClean="0"/>
@@ -6352,6 +6337,154 @@
     <p:extLst>
       <p:ext uri="{BB962C8B-B14F-4D97-AF65-F5344CB8AC3E}">
         <p14:creationId xmlns:p14="http://schemas.microsoft.com/office/powerpoint/2010/main" val="3414602489"/>
+      </p:ext>
+    </p:extLst>
+  </p:cSld>
+  <p:clrMapOvr>
+    <a:masterClrMapping/>
+  </p:clrMapOvr>
+  <p:timing>
+    <p:tnLst>
+      <p:par>
+        <p:cTn id="1" dur="indefinite" restart="never" nodeType="tmRoot"/>
+      </p:par>
+    </p:tnLst>
+  </p:timing>
+</p:sld>
+</file>
+
+<file path=ppt/slides/slide19.xml><?xml version="1.0" encoding="utf-8"?>
+<p:sld xmlns:a="http://schemas.openxmlformats.org/drawingml/2006/main" xmlns:r="http://schemas.openxmlformats.org/officeDocument/2006/relationships" xmlns:p="http://schemas.openxmlformats.org/presentationml/2006/main">
+  <p:cSld>
+    <p:spTree>
+      <p:nvGrpSpPr>
+        <p:cNvPr id="1" name=""/>
+        <p:cNvGrpSpPr/>
+        <p:nvPr/>
+      </p:nvGrpSpPr>
+      <p:grpSpPr>
+        <a:xfrm>
+          <a:off x="0" y="0"/>
+          <a:ext cx="0" cy="0"/>
+          <a:chOff x="0" y="0"/>
+          <a:chExt cx="0" cy="0"/>
+        </a:xfrm>
+      </p:grpSpPr>
+      <p:sp>
+        <p:nvSpPr>
+          <p:cNvPr id="2" name="Title 1"/>
+          <p:cNvSpPr>
+            <a:spLocks noGrp="1"/>
+          </p:cNvSpPr>
+          <p:nvPr>
+            <p:ph type="title" idx="4294967295"/>
+          </p:nvPr>
+        </p:nvSpPr>
+        <p:spPr>
+          <a:xfrm>
+            <a:off x="139700" y="2070100"/>
+            <a:ext cx="4889500" cy="1812925"/>
+          </a:xfrm>
+        </p:spPr>
+        <p:txBody>
+          <a:bodyPr>
+            <a:noAutofit/>
+          </a:bodyPr>
+          <a:lstStyle/>
+          <a:p>
+            <a:r>
+              <a:rPr lang="en-US" sz="4000" b="1" dirty="0"/>
+              <a:t>Sample Output </a:t>
+            </a:r>
+            <a:r>
+              <a:rPr lang="en-US" sz="4000" b="1" dirty="0" err="1"/>
+              <a:t>Dataframe</a:t>
+            </a:r>
+            <a:endParaRPr lang="en-US" sz="4000" b="1" dirty="0"/>
+          </a:p>
+        </p:txBody>
+      </p:sp>
+      <p:cxnSp>
+        <p:nvCxnSpPr>
+          <p:cNvPr id="5" name="Straight Connector 4"/>
+          <p:cNvCxnSpPr/>
+          <p:nvPr/>
+        </p:nvCxnSpPr>
+        <p:spPr>
+          <a:xfrm>
+            <a:off x="5029200" y="149224"/>
+            <a:ext cx="0" cy="6035675"/>
+          </a:xfrm>
+          <a:prstGeom prst="line">
+            <a:avLst/>
+          </a:prstGeom>
+        </p:spPr>
+        <p:style>
+          <a:lnRef idx="1">
+            <a:schemeClr val="accent1"/>
+          </a:lnRef>
+          <a:fillRef idx="0">
+            <a:schemeClr val="accent1"/>
+          </a:fillRef>
+          <a:effectRef idx="0">
+            <a:schemeClr val="accent1"/>
+          </a:effectRef>
+          <a:fontRef idx="minor">
+            <a:schemeClr val="tx1"/>
+          </a:fontRef>
+        </p:style>
+      </p:cxnSp>
+      <p:sp>
+        <p:nvSpPr>
+          <p:cNvPr id="3" name="Footer Placeholder 2"/>
+          <p:cNvSpPr>
+            <a:spLocks noGrp="1"/>
+          </p:cNvSpPr>
+          <p:nvPr>
+            <p:ph type="ftr" sz="quarter" idx="11"/>
+          </p:nvPr>
+        </p:nvSpPr>
+        <p:spPr/>
+        <p:txBody>
+          <a:bodyPr/>
+          <a:lstStyle/>
+          <a:p>
+            <a:r>
+              <a:rPr lang="en-US" smtClean="0"/>
+              <a:t>NAGA KALYAN C S SARMA V (2018AH04042)</a:t>
+            </a:r>
+            <a:endParaRPr lang="en-US"/>
+          </a:p>
+        </p:txBody>
+      </p:sp>
+      <p:pic>
+        <p:nvPicPr>
+          <p:cNvPr id="6" name="Picture 5"/>
+          <p:cNvPicPr>
+            <a:picLocks noChangeAspect="1"/>
+          </p:cNvPicPr>
+          <p:nvPr/>
+        </p:nvPicPr>
+        <p:blipFill>
+          <a:blip r:embed="rId2"/>
+          <a:stretch>
+            <a:fillRect/>
+          </a:stretch>
+        </p:blipFill>
+        <p:spPr>
+          <a:xfrm>
+            <a:off x="5440613" y="1616075"/>
+            <a:ext cx="6136751" cy="2736850"/>
+          </a:xfrm>
+          <a:prstGeom prst="rect">
+            <a:avLst/>
+          </a:prstGeom>
+        </p:spPr>
+      </p:pic>
+    </p:spTree>
+    <p:extLst>
+      <p:ext uri="{BB962C8B-B14F-4D97-AF65-F5344CB8AC3E}">
+        <p14:creationId xmlns:p14="http://schemas.microsoft.com/office/powerpoint/2010/main" val="3388981441"/>
       </p:ext>
     </p:extLst>
   </p:cSld>
@@ -6488,6 +6621,156 @@
     <p:extLst>
       <p:ext uri="{BB962C8B-B14F-4D97-AF65-F5344CB8AC3E}">
         <p14:creationId xmlns:p14="http://schemas.microsoft.com/office/powerpoint/2010/main" val="2512616967"/>
+      </p:ext>
+    </p:extLst>
+  </p:cSld>
+  <p:clrMapOvr>
+    <a:masterClrMapping/>
+  </p:clrMapOvr>
+  <p:timing>
+    <p:tnLst>
+      <p:par>
+        <p:cTn id="1" dur="indefinite" restart="never" nodeType="tmRoot"/>
+      </p:par>
+    </p:tnLst>
+  </p:timing>
+</p:sld>
+</file>
+
+<file path=ppt/slides/slide20.xml><?xml version="1.0" encoding="utf-8"?>
+<p:sld xmlns:a="http://schemas.openxmlformats.org/drawingml/2006/main" xmlns:r="http://schemas.openxmlformats.org/officeDocument/2006/relationships" xmlns:p="http://schemas.openxmlformats.org/presentationml/2006/main">
+  <p:cSld>
+    <p:spTree>
+      <p:nvGrpSpPr>
+        <p:cNvPr id="1" name=""/>
+        <p:cNvGrpSpPr/>
+        <p:nvPr/>
+      </p:nvGrpSpPr>
+      <p:grpSpPr>
+        <a:xfrm>
+          <a:off x="0" y="0"/>
+          <a:ext cx="0" cy="0"/>
+          <a:chOff x="0" y="0"/>
+          <a:chExt cx="0" cy="0"/>
+        </a:xfrm>
+      </p:grpSpPr>
+      <p:sp>
+        <p:nvSpPr>
+          <p:cNvPr id="2" name="Title 1"/>
+          <p:cNvSpPr>
+            <a:spLocks noGrp="1"/>
+          </p:cNvSpPr>
+          <p:nvPr>
+            <p:ph type="title" idx="4294967295"/>
+          </p:nvPr>
+        </p:nvSpPr>
+        <p:spPr>
+          <a:xfrm>
+            <a:off x="76200" y="2070100"/>
+            <a:ext cx="3797300" cy="1812925"/>
+          </a:xfrm>
+        </p:spPr>
+        <p:txBody>
+          <a:bodyPr>
+            <a:noAutofit/>
+          </a:bodyPr>
+          <a:lstStyle/>
+          <a:p>
+            <a:r>
+              <a:rPr lang="fr-FR" sz="4000" b="1" dirty="0" err="1"/>
+              <a:t>Sample</a:t>
+            </a:r>
+            <a:r>
+              <a:rPr lang="fr-FR" sz="4000" b="1" dirty="0"/>
+              <a:t> Output Plots - Divergence </a:t>
+            </a:r>
+            <a:r>
+              <a:rPr lang="fr-FR" sz="4000" b="1" dirty="0" err="1"/>
+              <a:t>comparison</a:t>
+            </a:r>
+            <a:endParaRPr lang="en-US" sz="4000" b="1" dirty="0"/>
+          </a:p>
+        </p:txBody>
+      </p:sp>
+      <p:cxnSp>
+        <p:nvCxnSpPr>
+          <p:cNvPr id="5" name="Straight Connector 4"/>
+          <p:cNvCxnSpPr/>
+          <p:nvPr/>
+        </p:nvCxnSpPr>
+        <p:spPr>
+          <a:xfrm>
+            <a:off x="4343400" y="174624"/>
+            <a:ext cx="0" cy="6035675"/>
+          </a:xfrm>
+          <a:prstGeom prst="line">
+            <a:avLst/>
+          </a:prstGeom>
+        </p:spPr>
+        <p:style>
+          <a:lnRef idx="1">
+            <a:schemeClr val="accent1"/>
+          </a:lnRef>
+          <a:fillRef idx="0">
+            <a:schemeClr val="accent1"/>
+          </a:fillRef>
+          <a:effectRef idx="0">
+            <a:schemeClr val="accent1"/>
+          </a:effectRef>
+          <a:fontRef idx="minor">
+            <a:schemeClr val="tx1"/>
+          </a:fontRef>
+        </p:style>
+      </p:cxnSp>
+      <p:sp>
+        <p:nvSpPr>
+          <p:cNvPr id="3" name="Footer Placeholder 2"/>
+          <p:cNvSpPr>
+            <a:spLocks noGrp="1"/>
+          </p:cNvSpPr>
+          <p:nvPr>
+            <p:ph type="ftr" sz="quarter" idx="11"/>
+          </p:nvPr>
+        </p:nvSpPr>
+        <p:spPr/>
+        <p:txBody>
+          <a:bodyPr/>
+          <a:lstStyle/>
+          <a:p>
+            <a:r>
+              <a:rPr lang="en-US" smtClean="0"/>
+              <a:t>NAGA KALYAN C S SARMA V (2018AH04042)</a:t>
+            </a:r>
+            <a:endParaRPr lang="en-US"/>
+          </a:p>
+        </p:txBody>
+      </p:sp>
+      <p:pic>
+        <p:nvPicPr>
+          <p:cNvPr id="6" name="Picture 5"/>
+          <p:cNvPicPr/>
+          <p:nvPr/>
+        </p:nvPicPr>
+        <p:blipFill>
+          <a:blip r:embed="rId2"/>
+          <a:stretch>
+            <a:fillRect/>
+          </a:stretch>
+        </p:blipFill>
+        <p:spPr>
+          <a:xfrm>
+            <a:off x="4813301" y="904239"/>
+            <a:ext cx="7023093" cy="4963161"/>
+          </a:xfrm>
+          <a:prstGeom prst="rect">
+            <a:avLst/>
+          </a:prstGeom>
+        </p:spPr>
+      </p:pic>
+    </p:spTree>
+    <p:extLst>
+      <p:ext uri="{BB962C8B-B14F-4D97-AF65-F5344CB8AC3E}">
+        <p14:creationId xmlns:p14="http://schemas.microsoft.com/office/powerpoint/2010/main" val="531770060"/>
       </p:ext>
     </p:extLst>
   </p:cSld>
@@ -6725,11 +7008,7 @@
             <a:pPr lvl="2"/>
             <a:r>
               <a:rPr lang="en-US" dirty="0" smtClean="0"/>
-              <a:t>Trained </a:t>
-            </a:r>
-            <a:r>
-              <a:rPr lang="en-US" dirty="0" smtClean="0"/>
-              <a:t>a multi-layer Convolutional Neural Network from scratch by leveraging a training dataset available on public domain</a:t>
+              <a:t>Trained a multi-layer Convolutional Neural Network from scratch by leveraging a training dataset available on public domain</a:t>
             </a:r>
           </a:p>
           <a:p>
@@ -6947,11 +7226,7 @@
             <a:pPr lvl="1"/>
             <a:r>
               <a:rPr lang="en-US" dirty="0" smtClean="0"/>
-              <a:t>Libraries: Keras, OpenCV, boto3, numpy, pandas, </a:t>
-            </a:r>
-            <a:r>
-              <a:rPr lang="en-US" dirty="0" smtClean="0"/>
-              <a:t>matplotlib, </a:t>
+              <a:t>Libraries: Keras, OpenCV, boto3, numpy, pandas, matplotlib, </a:t>
             </a:r>
             <a:r>
               <a:rPr lang="en-US" dirty="0" err="1" smtClean="0"/>
@@ -6961,7 +7236,6 @@
               <a:rPr lang="en-US" dirty="0" smtClean="0"/>
               <a:t>-image</a:t>
             </a:r>
-            <a:endParaRPr lang="en-US" dirty="0" smtClean="0"/>
           </a:p>
           <a:p>
             <a:pPr lvl="1"/>
@@ -7394,12 +7668,6 @@
               </a:rPr>
               <a:t>Notebook Instance</a:t>
             </a:r>
-            <a:endParaRPr lang="en-US" sz="1000" dirty="0" smtClean="0">
-              <a:solidFill>
-                <a:srgbClr val="000000"/>
-              </a:solidFill>
-              <a:latin typeface="Arial"/>
-            </a:endParaRPr>
           </a:p>
           <a:p>
             <a:pPr algn="ctr"/>
@@ -7589,7 +7857,7 @@
           <a:blip r:embed="rId3">
             <a:extLst>
               <a:ext uri="{96DAC541-7B7A-43D3-8B79-37D633B846F1}">
-                <asvg:svgBlip xmlns="" xmlns:asvg="http://schemas.microsoft.com/office/drawing/2016/SVG/main" r:embed="rId6"/>
+                <asvg:svgBlip xmlns:asvg="http://schemas.microsoft.com/office/drawing/2016/SVG/main" xmlns="" r:embed="rId6"/>
               </a:ext>
             </a:extLst>
           </a:blip>
@@ -7929,7 +8197,7 @@
           <a:blip r:embed="rId7">
             <a:extLst>
               <a:ext uri="{96DAC541-7B7A-43D3-8B79-37D633B846F1}">
-                <asvg:svgBlip xmlns="" xmlns:asvg="http://schemas.microsoft.com/office/drawing/2016/SVG/main" r:embed="rId8"/>
+                <asvg:svgBlip xmlns:asvg="http://schemas.microsoft.com/office/drawing/2016/SVG/main" xmlns="" r:embed="rId8"/>
               </a:ext>
             </a:extLst>
           </a:blip>
@@ -9423,7 +9691,7 @@
           <a:blip r:embed="rId9">
             <a:extLst>
               <a:ext uri="{96DAC541-7B7A-43D3-8B79-37D633B846F1}">
-                <asvg:svgBlip xmlns="" xmlns:asvg="http://schemas.microsoft.com/office/drawing/2016/SVG/main" r:embed="rId17"/>
+                <asvg:svgBlip xmlns:asvg="http://schemas.microsoft.com/office/drawing/2016/SVG/main" xmlns="" r:embed="rId17"/>
               </a:ext>
             </a:extLst>
           </a:blip>
@@ -9459,7 +9727,7 @@
           <a:blip r:embed="rId18">
             <a:extLst>
               <a:ext uri="{96DAC541-7B7A-43D3-8B79-37D633B846F1}">
-                <asvg:svgBlip xmlns="" xmlns:asvg="http://schemas.microsoft.com/office/drawing/2016/SVG/main" r:embed="rId19"/>
+                <asvg:svgBlip xmlns:asvg="http://schemas.microsoft.com/office/drawing/2016/SVG/main" xmlns="" r:embed="rId19"/>
               </a:ext>
             </a:extLst>
           </a:blip>
@@ -9565,7 +9833,7 @@
           <a:blip r:embed="rId3">
             <a:extLst>
               <a:ext uri="{96DAC541-7B7A-43D3-8B79-37D633B846F1}">
-                <asvg:svgBlip xmlns="" xmlns:asvg="http://schemas.microsoft.com/office/drawing/2016/SVG/main" r:embed="rId6"/>
+                <asvg:svgBlip xmlns:asvg="http://schemas.microsoft.com/office/drawing/2016/SVG/main" xmlns="" r:embed="rId6"/>
               </a:ext>
             </a:extLst>
           </a:blip>
@@ -9937,7 +10205,7 @@
           <a:blip r:embed="rId18">
             <a:extLst>
               <a:ext uri="{96DAC541-7B7A-43D3-8B79-37D633B846F1}">
-                <asvg:svgBlip xmlns="" xmlns:asvg="http://schemas.microsoft.com/office/drawing/2016/SVG/main" r:embed="rId19"/>
+                <asvg:svgBlip xmlns:asvg="http://schemas.microsoft.com/office/drawing/2016/SVG/main" xmlns="" r:embed="rId19"/>
               </a:ext>
             </a:extLst>
           </a:blip>
@@ -9973,7 +10241,7 @@
           <a:blip r:embed="rId21">
             <a:extLst>
               <a:ext uri="{96DAC541-7B7A-43D3-8B79-37D633B846F1}">
-                <asvg:svgBlip xmlns:asvg="http://schemas.microsoft.com/office/drawing/2016/SVG/main" xmlns="" r:embed="rId31"/>
+                <asvg:svgBlip xmlns="" xmlns:asvg="http://schemas.microsoft.com/office/drawing/2016/SVG/main" r:embed="rId31"/>
               </a:ext>
             </a:extLst>
           </a:blip>
@@ -10731,16 +10999,7 @@
                 </a:solidFill>
                 <a:latin typeface="Arial"/>
               </a:rPr>
-              <a:t>changes</a:t>
-            </a:r>
-            <a:r>
-              <a:rPr lang="en-US" sz="900" dirty="0" smtClean="0">
-                <a:solidFill>
-                  <a:srgbClr val="000000"/>
-                </a:solidFill>
-                <a:latin typeface="Arial"/>
-              </a:rPr>
-              <a:t>)</a:t>
+              <a:t>changes)</a:t>
             </a:r>
             <a:endParaRPr lang="en-US" sz="1200" dirty="0">
               <a:solidFill>
@@ -11486,16 +11745,7 @@
                 </a:solidFill>
                 <a:latin typeface="Arial"/>
               </a:rPr>
-              <a:t>changes</a:t>
-            </a:r>
-            <a:r>
-              <a:rPr lang="en-US" sz="900" dirty="0" smtClean="0">
-                <a:solidFill>
-                  <a:srgbClr val="000000"/>
-                </a:solidFill>
-                <a:latin typeface="Arial"/>
-              </a:rPr>
-              <a:t>)</a:t>
+              <a:t>changes)</a:t>
             </a:r>
             <a:endParaRPr lang="en-US" sz="1200" dirty="0">
               <a:solidFill>

</xml_diff>